<commit_message>
Added credits to SerialSeb
</commit_message>
<xml_diff>
--- a/CommunityTalks/October 09 - DotNetRomaCesta/ASPNET MVC Framework - Best Practices - ENG.pptx
+++ b/CommunityTalks/October 09 - DotNetRomaCesta/ASPNET MVC Framework - Best Practices - ENG.pptx
@@ -5,10 +5,10 @@
     <p:sldMasterId id="2147483650" r:id="rId1"/>
   </p:sldMasterIdLst>
   <p:notesMasterIdLst>
-    <p:notesMasterId r:id="rId51"/>
+    <p:notesMasterId r:id="rId52"/>
   </p:notesMasterIdLst>
   <p:handoutMasterIdLst>
-    <p:handoutMasterId r:id="rId52"/>
+    <p:handoutMasterId r:id="rId53"/>
   </p:handoutMasterIdLst>
   <p:sldIdLst>
     <p:sldId id="372" r:id="rId2"/>
@@ -59,7 +59,8 @@
     <p:sldId id="419" r:id="rId47"/>
     <p:sldId id="312" r:id="rId48"/>
     <p:sldId id="374" r:id="rId49"/>
-    <p:sldId id="287" r:id="rId50"/>
+    <p:sldId id="421" r:id="rId50"/>
+    <p:sldId id="287" r:id="rId51"/>
   </p:sldIdLst>
   <p:sldSz cx="9144000" cy="6858000" type="screen4x3"/>
   <p:notesSz cx="7010400" cy="9296400"/>
@@ -274,7 +275,7 @@
             <a:fld id="{39DBD574-A14B-4F4E-902A-B8280CA594B9}" type="datetimeFigureOut">
               <a:rPr lang="en-US" smtClean="0"/>
               <a:pPr/>
-              <a:t>10/27/2009</a:t>
+              <a:t>10/30/2009</a:t>
             </a:fld>
             <a:endParaRPr lang="en-US"/>
           </a:p>
@@ -2679,11 +2680,7 @@
           <a:p>
             <a:r>
               <a:rPr lang="it-IT" dirty="0" smtClean="0"/>
-              <a:t>2 - Isolate controllers from the </a:t>
-            </a:r>
-            <a:r>
-              <a:rPr lang="it-IT" dirty="0" smtClean="0"/>
-              <a:t>outside World</a:t>
+              <a:t>2 - Isolate controllers from the outside World</a:t>
             </a:r>
             <a:endParaRPr lang="it-IT" dirty="0"/>
           </a:p>
@@ -2802,11 +2799,7 @@
           <a:p>
             <a:r>
               <a:rPr lang="it-IT" dirty="0" smtClean="0"/>
-              <a:t>2 - Isolate controllers from the </a:t>
-            </a:r>
-            <a:r>
-              <a:rPr lang="it-IT" dirty="0" smtClean="0"/>
-              <a:t>outside World</a:t>
+              <a:t>2 - Isolate controllers from the outside World</a:t>
             </a:r>
             <a:endParaRPr lang="it-IT" dirty="0"/>
           </a:p>
@@ -4113,11 +4106,7 @@
             </a:r>
             <a:r>
               <a:rPr lang="en-US" dirty="0" smtClean="0"/>
-              <a:t> inside ASP.NET MVC </a:t>
-            </a:r>
-            <a:r>
-              <a:rPr lang="en-US" dirty="0" smtClean="0"/>
-              <a:t>using </a:t>
+              <a:t> inside ASP.NET MVC using </a:t>
             </a:r>
             <a:r>
               <a:rPr lang="en-US" dirty="0" err="1" smtClean="0"/>
@@ -4334,15 +4323,7 @@
           <a:p>
             <a:r>
               <a:rPr lang="it-IT" dirty="0" smtClean="0"/>
-              <a:t>Never </a:t>
-            </a:r>
-            <a:r>
-              <a:rPr lang="it-IT" dirty="0" smtClean="0"/>
-              <a:t>use </a:t>
-            </a:r>
-            <a:r>
-              <a:rPr lang="it-IT" dirty="0" smtClean="0"/>
-              <a:t>ViewData[“key”]</a:t>
+              <a:t>Never use ViewData[“key”]</a:t>
             </a:r>
           </a:p>
           <a:p>
@@ -4521,47 +4502,14 @@
           <a:p>
             <a:r>
               <a:rPr lang="it-IT" dirty="0" smtClean="0"/>
-              <a:t>ASP.NET MVC is </a:t>
-            </a:r>
-            <a:r>
-              <a:rPr lang="it-IT" dirty="0" smtClean="0"/>
-              <a:t>the </a:t>
-            </a:r>
-            <a:r>
-              <a:rPr lang="it-IT" dirty="0" smtClean="0"/>
-              <a:t>base </a:t>
-            </a:r>
-            <a:r>
-              <a:rPr lang="it-IT" dirty="0" smtClean="0"/>
-              <a:t>on which </a:t>
-            </a:r>
-            <a:r>
-              <a:rPr lang="it-IT" dirty="0" smtClean="0"/>
-              <a:t>to build </a:t>
-            </a:r>
-            <a:r>
-              <a:rPr lang="it-IT" dirty="0" smtClean="0"/>
-              <a:t>your own reference architecture</a:t>
-            </a:r>
-          </a:p>
-          <a:p>
-            <a:r>
-              <a:rPr lang="it-IT" dirty="0" smtClean="0"/>
-              <a:t>Controllers (and views) </a:t>
-            </a:r>
-            <a:r>
-              <a:rPr lang="it-IT" dirty="0" smtClean="0"/>
-              <a:t>inherint from your </a:t>
-            </a:r>
-            <a:r>
-              <a:rPr lang="it-IT" dirty="0" smtClean="0"/>
-              <a:t>own base </a:t>
-            </a:r>
-            <a:r>
-              <a:rPr lang="it-IT" dirty="0" smtClean="0"/>
-              <a:t>class</a:t>
-            </a:r>
-            <a:endParaRPr lang="it-IT" dirty="0" smtClean="0"/>
+              <a:t>ASP.NET MVC is the base on which to build your own reference architecture</a:t>
+            </a:r>
+          </a:p>
+          <a:p>
+            <a:r>
+              <a:rPr lang="it-IT" dirty="0" smtClean="0"/>
+              <a:t>Controllers (and views) inherint from your own base class</a:t>
+            </a:r>
           </a:p>
         </p:txBody>
       </p:sp>
@@ -4637,19 +4585,7 @@
           <a:p>
             <a:r>
               <a:rPr lang="it-IT" dirty="0" smtClean="0"/>
-              <a:t>Best Practice </a:t>
-            </a:r>
-            <a:r>
-              <a:rPr lang="it-IT" dirty="0" smtClean="0"/>
-              <a:t>n°</a:t>
-            </a:r>
-            <a:r>
-              <a:rPr lang="it-IT" dirty="0" smtClean="0"/>
-              <a:t> </a:t>
-            </a:r>
-            <a:r>
-              <a:rPr lang="it-IT" dirty="0" smtClean="0"/>
-              <a:t>6</a:t>
+              <a:t>Best Practice n° 6</a:t>
             </a:r>
             <a:endParaRPr lang="it-IT" dirty="0"/>
           </a:p>
@@ -4953,15 +4889,7 @@
           <a:p>
             <a:r>
               <a:rPr lang="it-IT" dirty="0" smtClean="0"/>
-              <a:t>View sends data </a:t>
-            </a:r>
-            <a:r>
-              <a:rPr lang="it-IT" dirty="0" smtClean="0"/>
-              <a:t>in </a:t>
-            </a:r>
-            <a:r>
-              <a:rPr lang="it-IT" dirty="0" smtClean="0"/>
-              <a:t>POST</a:t>
+              <a:t>View sends data in POST</a:t>
             </a:r>
           </a:p>
           <a:p>
@@ -5576,25 +5504,15 @@
             <a:pPr lvl="1"/>
             <a:r>
               <a:rPr lang="it-IT" dirty="0" smtClean="0"/>
-              <a:t>Data + </a:t>
-            </a:r>
-            <a:r>
-              <a:rPr lang="it-IT" dirty="0" smtClean="0"/>
-              <a:t>Behaviours</a:t>
-            </a:r>
-            <a:endParaRPr lang="it-IT" dirty="0" smtClean="0"/>
+              <a:t>Data + Behaviours</a:t>
+            </a:r>
           </a:p>
           <a:p>
             <a:pPr lvl="1"/>
             <a:r>
               <a:rPr lang="it-IT" dirty="0" smtClean="0"/>
-              <a:t>hierarchical, </a:t>
-            </a:r>
-            <a:r>
-              <a:rPr lang="it-IT" dirty="0" smtClean="0"/>
-              <a:t>complex types</a:t>
-            </a:r>
-            <a:endParaRPr lang="it-IT" dirty="0" smtClean="0"/>
+              <a:t>hierarchical, complex types</a:t>
+            </a:r>
           </a:p>
           <a:p>
             <a:r>
@@ -7969,7 +7887,7 @@
       </p:grpSpPr>
       <p:sp>
         <p:nvSpPr>
-          <p:cNvPr id="5" name="Title 4"/>
+          <p:cNvPr id="2" name="Title 1"/>
           <p:cNvSpPr>
             <a:spLocks noGrp="1"/>
           </p:cNvSpPr>
@@ -7984,8 +7902,96 @@
           <a:p>
             <a:r>
               <a:rPr lang="en-US" dirty="0" smtClean="0"/>
-              <a:t>Q&amp;A</a:t>
-            </a:r>
+              <a:t>Credits</a:t>
+            </a:r>
+            <a:endParaRPr lang="en-US" dirty="0"/>
+          </a:p>
+        </p:txBody>
+      </p:sp>
+      <p:sp>
+        <p:nvSpPr>
+          <p:cNvPr id="3" name="Content Placeholder 2"/>
+          <p:cNvSpPr>
+            <a:spLocks noGrp="1"/>
+          </p:cNvSpPr>
+          <p:nvPr>
+            <p:ph idx="1"/>
+          </p:nvPr>
+        </p:nvSpPr>
+        <p:spPr>
+          <a:xfrm>
+            <a:off x="457200" y="990600"/>
+            <a:ext cx="8229600" cy="4081117"/>
+          </a:xfrm>
+        </p:spPr>
+        <p:txBody>
+          <a:bodyPr/>
+          <a:lstStyle/>
+          <a:p>
+            <a:r>
+              <a:rPr lang="en-US" dirty="0" smtClean="0"/>
+              <a:t>These talk has been inspired by </a:t>
+            </a:r>
+            <a:r>
+              <a:rPr lang="it-IT" smtClean="0"/>
+              <a:t>Sebastien </a:t>
+            </a:r>
+            <a:r>
+              <a:rPr lang="it-IT" smtClean="0"/>
+              <a:t>Lambla (founder of </a:t>
+            </a:r>
+            <a:r>
+              <a:rPr lang="it-IT" smtClean="0"/>
+              <a:t>Caffeine </a:t>
+            </a:r>
+            <a:r>
+              <a:rPr lang="it-IT" smtClean="0"/>
+              <a:t>IT) </a:t>
+            </a:r>
+            <a:r>
+              <a:rPr lang="it-IT" dirty="0" smtClean="0"/>
+              <a:t>and his ASP.NET MVC Best Practices</a:t>
+            </a:r>
+          </a:p>
+          <a:p>
+            <a:r>
+              <a:rPr lang="it-IT" dirty="0" smtClean="0"/>
+              <a:t>Watch his talk (which is way better than mine): </a:t>
+            </a:r>
+            <a:r>
+              <a:rPr lang="it-IT" dirty="0" smtClean="0">
+                <a:hlinkClick r:id="rId2"/>
+              </a:rPr>
+              <a:t>http://</a:t>
+            </a:r>
+            <a:r>
+              <a:rPr lang="it-IT" dirty="0" smtClean="0">
+                <a:hlinkClick r:id="rId2"/>
+              </a:rPr>
+              <a:t>serialseb.blogspot.com/2009/05/my-mvc-best-practices-talk.html</a:t>
+            </a:r>
+            <a:endParaRPr lang="en-US" dirty="0" smtClean="0"/>
+          </a:p>
+          <a:p>
+            <a:r>
+              <a:rPr lang="en-US" dirty="0" smtClean="0"/>
+              <a:t>Read his blog: </a:t>
+            </a:r>
+            <a:r>
+              <a:rPr lang="it-IT" dirty="0" smtClean="0">
+                <a:hlinkClick r:id="rId3"/>
+              </a:rPr>
+              <a:t>http://serialseb.blogspot.com/</a:t>
+            </a:r>
+            <a:endParaRPr lang="en-US" dirty="0" smtClean="0"/>
+          </a:p>
+          <a:p>
+            <a:pPr>
+              <a:buNone/>
+            </a:pPr>
+            <a:endParaRPr lang="en-US" dirty="0" smtClean="0"/>
+          </a:p>
+          <a:p>
             <a:endParaRPr lang="en-US" dirty="0"/>
           </a:p>
         </p:txBody>
@@ -8022,32 +8028,6 @@
           </a:p>
         </p:txBody>
       </p:sp>
-      <p:pic>
-        <p:nvPicPr>
-          <p:cNvPr id="7" name="Picture 2" descr="C:\projects\Boot camp\lolcats-funny-pictures-requests-in-triplicat.jpg"/>
-          <p:cNvPicPr>
-            <a:picLocks noChangeAspect="1" noChangeArrowheads="1"/>
-          </p:cNvPicPr>
-          <p:nvPr/>
-        </p:nvPicPr>
-        <p:blipFill>
-          <a:blip r:embed="rId2" cstate="print"/>
-          <a:srcRect/>
-          <a:stretch>
-            <a:fillRect/>
-          </a:stretch>
-        </p:blipFill>
-        <p:spPr bwMode="auto">
-          <a:xfrm>
-            <a:off x="1500166" y="1000108"/>
-            <a:ext cx="6525381" cy="5143536"/>
-          </a:xfrm>
-          <a:prstGeom prst="rect">
-            <a:avLst/>
-          </a:prstGeom>
-          <a:noFill/>
-        </p:spPr>
-      </p:pic>
     </p:spTree>
   </p:cSld>
   <p:clrMapOvr>
@@ -8137,6 +8117,119 @@
           </a:p>
         </p:txBody>
       </p:sp>
+    </p:spTree>
+  </p:cSld>
+  <p:clrMapOvr>
+    <a:masterClrMapping/>
+  </p:clrMapOvr>
+  <p:timing>
+    <p:tnLst>
+      <p:par>
+        <p:cTn id="1" dur="indefinite" restart="never" nodeType="tmRoot"/>
+      </p:par>
+    </p:tnLst>
+  </p:timing>
+</p:sld>
+</file>
+
+<file path=ppt/slides/slide50.xml><?xml version="1.0" encoding="utf-8"?>
+<p:sld xmlns:a="http://schemas.openxmlformats.org/drawingml/2006/main" xmlns:r="http://schemas.openxmlformats.org/officeDocument/2006/relationships" xmlns:p="http://schemas.openxmlformats.org/presentationml/2006/main">
+  <p:cSld>
+    <p:spTree>
+      <p:nvGrpSpPr>
+        <p:cNvPr id="1" name=""/>
+        <p:cNvGrpSpPr/>
+        <p:nvPr/>
+      </p:nvGrpSpPr>
+      <p:grpSpPr>
+        <a:xfrm>
+          <a:off x="0" y="0"/>
+          <a:ext cx="0" cy="0"/>
+          <a:chOff x="0" y="0"/>
+          <a:chExt cx="0" cy="0"/>
+        </a:xfrm>
+      </p:grpSpPr>
+      <p:sp>
+        <p:nvSpPr>
+          <p:cNvPr id="5" name="Title 4"/>
+          <p:cNvSpPr>
+            <a:spLocks noGrp="1"/>
+          </p:cNvSpPr>
+          <p:nvPr>
+            <p:ph type="title"/>
+          </p:nvPr>
+        </p:nvSpPr>
+        <p:spPr/>
+        <p:txBody>
+          <a:bodyPr/>
+          <a:lstStyle/>
+          <a:p>
+            <a:r>
+              <a:rPr lang="en-US" dirty="0" smtClean="0"/>
+              <a:t>Q&amp;A</a:t>
+            </a:r>
+            <a:endParaRPr lang="en-US" dirty="0"/>
+          </a:p>
+        </p:txBody>
+      </p:sp>
+      <p:sp>
+        <p:nvSpPr>
+          <p:cNvPr id="4" name="Slide Number Placeholder 3"/>
+          <p:cNvSpPr>
+            <a:spLocks noGrp="1"/>
+          </p:cNvSpPr>
+          <p:nvPr>
+            <p:ph type="sldNum" sz="quarter" idx="4294967295"/>
+          </p:nvPr>
+        </p:nvSpPr>
+        <p:spPr>
+          <a:xfrm>
+            <a:off x="0" y="6172200"/>
+            <a:ext cx="2133600" cy="323850"/>
+          </a:xfrm>
+          <a:prstGeom prst="rect">
+            <a:avLst/>
+          </a:prstGeom>
+        </p:spPr>
+        <p:txBody>
+          <a:bodyPr/>
+          <a:lstStyle/>
+          <a:p>
+            <a:fld id="{B9EAB02C-EC2A-4E09-A324-1FFFBDB5DA2B}" type="slidenum">
+              <a:rPr lang="en-US" smtClean="0"/>
+              <a:pPr/>
+              <a:t>49</a:t>
+            </a:fld>
+            <a:endParaRPr lang="en-US"/>
+          </a:p>
+        </p:txBody>
+      </p:sp>
+      <p:pic>
+        <p:nvPicPr>
+          <p:cNvPr id="7" name="Picture 2" descr="C:\projects\Boot camp\lolcats-funny-pictures-requests-in-triplicat.jpg"/>
+          <p:cNvPicPr>
+            <a:picLocks noChangeAspect="1" noChangeArrowheads="1"/>
+          </p:cNvPicPr>
+          <p:nvPr/>
+        </p:nvPicPr>
+        <p:blipFill>
+          <a:blip r:embed="rId2" cstate="print"/>
+          <a:srcRect/>
+          <a:stretch>
+            <a:fillRect/>
+          </a:stretch>
+        </p:blipFill>
+        <p:spPr bwMode="auto">
+          <a:xfrm>
+            <a:off x="1500166" y="1000108"/>
+            <a:ext cx="6525381" cy="5143536"/>
+          </a:xfrm>
+          <a:prstGeom prst="rect">
+            <a:avLst/>
+          </a:prstGeom>
+          <a:noFill/>
+        </p:spPr>
+      </p:pic>
     </p:spTree>
   </p:cSld>
   <p:clrMapOvr>
@@ -8907,15 +9000,7 @@
             <a:pPr algn="ctr"/>
             <a:r>
               <a:rPr lang="en-US" sz="1400" dirty="0" smtClean="0"/>
-              <a:t>The Model </a:t>
-            </a:r>
-            <a:r>
-              <a:rPr lang="en-US" sz="1400" dirty="0" smtClean="0"/>
-              <a:t>gives </a:t>
-            </a:r>
-            <a:r>
-              <a:rPr lang="en-US" sz="1400" dirty="0" smtClean="0"/>
-              <a:t>the data back to the Controller</a:t>
+              <a:t>The Model gives the data back to the Controller</a:t>
             </a:r>
             <a:endParaRPr lang="en-US" sz="1400" dirty="0"/>
           </a:p>
@@ -8962,15 +9047,7 @@
           <a:p>
             <a:r>
               <a:rPr lang="en-US" sz="1400" dirty="0" smtClean="0"/>
-              <a:t>The controller formats the data and </a:t>
-            </a:r>
-            <a:r>
-              <a:rPr lang="en-US" sz="1400" dirty="0" smtClean="0"/>
-              <a:t>passes </a:t>
-            </a:r>
-            <a:r>
-              <a:rPr lang="en-US" sz="1400" dirty="0" smtClean="0"/>
-              <a:t>them to the View</a:t>
+              <a:t>The controller formats the data and passes them to the View</a:t>
             </a:r>
             <a:endParaRPr lang="en-US" sz="1400" dirty="0"/>
           </a:p>
@@ -9841,29 +9918,13 @@
           <a:p>
             <a:r>
               <a:rPr lang="it-IT" dirty="0" smtClean="0"/>
-              <a:t>You will probably never use </a:t>
-            </a:r>
-            <a:r>
-              <a:rPr lang="it-IT" dirty="0" smtClean="0"/>
-              <a:t>these </a:t>
-            </a:r>
-            <a:r>
-              <a:rPr lang="it-IT" dirty="0" smtClean="0"/>
-              <a:t>account management pages</a:t>
-            </a:r>
-          </a:p>
-          <a:p>
-            <a:r>
-              <a:rPr lang="it-IT" dirty="0" smtClean="0"/>
-              <a:t>Keeping </a:t>
-            </a:r>
-            <a:r>
-              <a:rPr lang="it-IT" dirty="0" smtClean="0"/>
-              <a:t>demo </a:t>
-            </a:r>
-            <a:r>
-              <a:rPr lang="it-IT" dirty="0" smtClean="0"/>
-              <a:t>code in a production application is EVIL</a:t>
+              <a:t>You will probably never use these account management pages</a:t>
+            </a:r>
+          </a:p>
+          <a:p>
+            <a:r>
+              <a:rPr lang="it-IT" dirty="0" smtClean="0"/>
+              <a:t>Keeping demo code in a production application is EVIL</a:t>
             </a:r>
           </a:p>
           <a:p>

</xml_diff>